<commit_message>
Shortened presentation so it doesn take longer than 20 mins
</commit_message>
<xml_diff>
--- a/Thesis_Documentation/Presentation_Slides/Abschlusspräsentation.pptx
+++ b/Thesis_Documentation/Presentation_Slides/Abschlusspräsentation.pptx
@@ -5,10 +5,10 @@
     <p:sldMasterId id="2147483744" r:id="rId1"/>
   </p:sldMasterIdLst>
   <p:notesMasterIdLst>
-    <p:notesMasterId r:id="rId11"/>
+    <p:notesMasterId r:id="rId10"/>
   </p:notesMasterIdLst>
   <p:handoutMasterIdLst>
-    <p:handoutMasterId r:id="rId12"/>
+    <p:handoutMasterId r:id="rId11"/>
   </p:handoutMasterIdLst>
   <p:sldIdLst>
     <p:sldId id="256" r:id="rId2"/>
@@ -19,7 +19,6 @@
     <p:sldId id="257" r:id="rId7"/>
     <p:sldId id="274" r:id="rId8"/>
     <p:sldId id="277" r:id="rId9"/>
-    <p:sldId id="278" r:id="rId10"/>
   </p:sldIdLst>
   <p:sldSz cx="12192000" cy="6858000"/>
   <p:notesSz cx="6858000" cy="9144000"/>
@@ -220,7 +219,7 @@
           <a:p>
             <a:fld id="{B2CB269B-641E-4EE6-BE40-077674941A9F}" type="datetimeFigureOut">
               <a:rPr lang="de-IT" smtClean="0"/>
-              <a:t>28.01.2025</a:t>
+              <a:t>29.01.2025</a:t>
             </a:fld>
             <a:endParaRPr lang="de-IT"/>
           </a:p>
@@ -398,7 +397,7 @@
           <a:p>
             <a:fld id="{377D96F0-AF70-4B85-BC1F-989062EBAAB2}" type="datetimeFigureOut">
               <a:rPr lang="de-IT" smtClean="0"/>
-              <a:t>28.01.2025</a:t>
+              <a:t>29.01.2025</a:t>
             </a:fld>
             <a:endParaRPr lang="de-IT"/>
           </a:p>
@@ -957,7 +956,7 @@
           <a:p>
             <a:fld id="{36FAABAC-989F-46DC-BEA5-6E800E69F88E}" type="datetime1">
               <a:rPr lang="de-IT" smtClean="0"/>
-              <a:t>28.01.2025</a:t>
+              <a:t>29.01.2025</a:t>
             </a:fld>
             <a:endParaRPr lang="de-IT"/>
           </a:p>
@@ -1185,7 +1184,7 @@
           <a:p>
             <a:fld id="{E6E76FE0-2AFA-4A1B-8261-007468DA6158}" type="datetime1">
               <a:rPr lang="de-IT" smtClean="0"/>
-              <a:t>28.01.2025</a:t>
+              <a:t>29.01.2025</a:t>
             </a:fld>
             <a:endParaRPr lang="de-IT"/>
           </a:p>
@@ -1365,7 +1364,7 @@
           <a:p>
             <a:fld id="{553098B2-EFE1-4007-99B5-CC6B85135E41}" type="datetime1">
               <a:rPr lang="de-IT" smtClean="0"/>
-              <a:t>28.01.2025</a:t>
+              <a:t>29.01.2025</a:t>
             </a:fld>
             <a:endParaRPr lang="de-IT"/>
           </a:p>
@@ -1535,7 +1534,7 @@
           <a:p>
             <a:fld id="{BAC92A5D-20C6-4042-A69D-C13A211465A1}" type="datetime1">
               <a:rPr lang="de-IT" smtClean="0"/>
-              <a:t>28.01.2025</a:t>
+              <a:t>29.01.2025</a:t>
             </a:fld>
             <a:endParaRPr lang="de-IT"/>
           </a:p>
@@ -1789,7 +1788,7 @@
           <a:p>
             <a:fld id="{0121149F-8078-4A3F-92E8-37B52DCBE794}" type="datetime1">
               <a:rPr lang="de-IT" smtClean="0"/>
-              <a:t>28.01.2025</a:t>
+              <a:t>29.01.2025</a:t>
             </a:fld>
             <a:endParaRPr lang="de-IT"/>
           </a:p>
@@ -2115,7 +2114,7 @@
           <a:p>
             <a:fld id="{D4D7A73B-5BE3-442F-ADCE-00214E3762D1}" type="datetime1">
               <a:rPr lang="de-IT" smtClean="0"/>
-              <a:t>28.01.2025</a:t>
+              <a:t>29.01.2025</a:t>
             </a:fld>
             <a:endParaRPr lang="de-IT"/>
           </a:p>
@@ -2566,7 +2565,7 @@
           <a:p>
             <a:fld id="{FE208888-0EDF-4695-99F8-4C25A5501CDE}" type="datetime1">
               <a:rPr lang="de-IT" smtClean="0"/>
-              <a:t>28.01.2025</a:t>
+              <a:t>29.01.2025</a:t>
             </a:fld>
             <a:endParaRPr lang="de-IT"/>
           </a:p>
@@ -2684,7 +2683,7 @@
           <a:p>
             <a:fld id="{D01B4F2E-EAFD-4A3E-BDFA-9929798DADCE}" type="datetime1">
               <a:rPr lang="de-IT" smtClean="0"/>
-              <a:t>28.01.2025</a:t>
+              <a:t>29.01.2025</a:t>
             </a:fld>
             <a:endParaRPr lang="de-IT"/>
           </a:p>
@@ -2779,7 +2778,7 @@
           <a:p>
             <a:fld id="{04BB0BCF-AE31-4278-A81B-AE2F75033C15}" type="datetime1">
               <a:rPr lang="de-IT" smtClean="0"/>
-              <a:t>28.01.2025</a:t>
+              <a:t>29.01.2025</a:t>
             </a:fld>
             <a:endParaRPr lang="de-IT"/>
           </a:p>
@@ -3066,7 +3065,7 @@
           <a:p>
             <a:fld id="{EDBBFDD8-F5FF-4AC9-9085-A8595A728D93}" type="datetime1">
               <a:rPr lang="de-IT" smtClean="0"/>
-              <a:t>28.01.2025</a:t>
+              <a:t>29.01.2025</a:t>
             </a:fld>
             <a:endParaRPr lang="de-IT"/>
           </a:p>
@@ -3388,7 +3387,7 @@
           <a:p>
             <a:fld id="{30E88503-7BFD-44E0-8031-2C296FB5F4B6}" type="datetime1">
               <a:rPr lang="de-IT" smtClean="0"/>
-              <a:t>28.01.2025</a:t>
+              <a:t>29.01.2025</a:t>
             </a:fld>
             <a:endParaRPr lang="de-IT"/>
           </a:p>
@@ -3642,7 +3641,7 @@
           <a:p>
             <a:fld id="{868DF31C-022E-411B-8F81-465E9A5F5E66}" type="datetime1">
               <a:rPr lang="de-IT" smtClean="0"/>
-              <a:t>28.01.2025</a:t>
+              <a:t>29.01.2025</a:t>
             </a:fld>
             <a:endParaRPr lang="de-IT"/>
           </a:p>
@@ -4393,7 +4392,7 @@
                   <a:schemeClr val="tx1"/>
                 </a:solidFill>
               </a:rPr>
-              <a:t>Folie 1 von 9</a:t>
+              <a:t>Folie 1 von 8</a:t>
             </a:r>
             <a:endParaRPr lang="de-IT" sz="1200" dirty="0">
               <a:solidFill>
@@ -4670,7 +4669,7 @@
                   <a:schemeClr val="bg1"/>
                 </a:solidFill>
               </a:rPr>
-              <a:t>2/9</a:t>
+              <a:t>2/8</a:t>
             </a:r>
             <a:endParaRPr lang="de-IT" sz="1200" b="1" dirty="0">
               <a:solidFill>
@@ -4985,7 +4984,7 @@
                   <a:schemeClr val="bg1"/>
                 </a:solidFill>
               </a:rPr>
-              <a:t>3/9</a:t>
+              <a:t>3/8</a:t>
             </a:r>
             <a:endParaRPr lang="de-IT" sz="1200" b="1" dirty="0">
               <a:solidFill>
@@ -5345,7 +5344,7 @@
                   <a:schemeClr val="bg1"/>
                 </a:solidFill>
               </a:rPr>
-              <a:t>4/9</a:t>
+              <a:t>4/8</a:t>
             </a:r>
             <a:endParaRPr lang="de-IT" sz="1200" b="1" dirty="0">
               <a:solidFill>
@@ -5592,7 +5591,7 @@
         </p:nvSpPr>
         <p:spPr>
           <a:xfrm>
-            <a:off x="388223" y="4642795"/>
+            <a:off x="259396" y="4057579"/>
             <a:ext cx="10629900" cy="923330"/>
           </a:xfrm>
           <a:prstGeom prst="rect">
@@ -5621,50 +5620,6 @@
             <a:r>
               <a:rPr lang="en-US" i="1" dirty="0"/>
               <a:t>Anyone else dealt with this headache?"</a:t>
-            </a:r>
-            <a:endParaRPr lang="de-IT" i="1" dirty="0"/>
-          </a:p>
-        </p:txBody>
-      </p:sp>
-      <p:sp>
-        <p:nvSpPr>
-          <p:cNvPr id="6" name="Textfeld 5">
-            <a:extLst>
-              <a:ext uri="{FF2B5EF4-FFF2-40B4-BE49-F238E27FC236}">
-                <a16:creationId xmlns:a16="http://schemas.microsoft.com/office/drawing/2014/main" id="{4DF198B3-0A67-3168-8D3F-B459D42C755C}"/>
-              </a:ext>
-            </a:extLst>
-          </p:cNvPr>
-          <p:cNvSpPr txBox="1"/>
-          <p:nvPr/>
-        </p:nvSpPr>
-        <p:spPr>
-          <a:xfrm>
-            <a:off x="338909" y="3659465"/>
-            <a:ext cx="8595360" cy="369332"/>
-          </a:xfrm>
-          <a:prstGeom prst="rect">
-            <a:avLst/>
-          </a:prstGeom>
-          <a:noFill/>
-        </p:spPr>
-        <p:txBody>
-          <a:bodyPr wrap="square" rtlCol="0">
-            <a:spAutoFit/>
-          </a:bodyPr>
-          <a:lstStyle/>
-          <a:p>
-            <a:r>
-              <a:rPr lang="en-US" i="1" dirty="0"/>
-              <a:t>“have you actually written and deployed microservices? </a:t>
-            </a:r>
-            <a:r>
-              <a:rPr lang="en-US" i="1" dirty="0" err="1"/>
-              <a:t>i</a:t>
-            </a:r>
-            <a:r>
-              <a:rPr lang="en-US" i="1" dirty="0"/>
-              <a:t> don't think you have.”</a:t>
             </a:r>
             <a:endParaRPr lang="de-IT" i="1" dirty="0"/>
           </a:p>
@@ -5800,7 +5755,7 @@
                   <a:schemeClr val="bg1"/>
                 </a:solidFill>
               </a:rPr>
-              <a:t>5/9</a:t>
+              <a:t>5/8</a:t>
             </a:r>
             <a:endParaRPr lang="de-IT" sz="1200" b="1" dirty="0">
               <a:solidFill>
@@ -5999,7 +5954,7 @@
                   <a:schemeClr val="bg1"/>
                 </a:solidFill>
               </a:rPr>
-              <a:t>6/9</a:t>
+              <a:t>6/8</a:t>
             </a:r>
             <a:endParaRPr lang="de-IT" sz="1200" b="1" dirty="0">
               <a:solidFill>
@@ -6322,7 +6277,7 @@
                   <a:schemeClr val="bg1"/>
                 </a:solidFill>
               </a:rPr>
-              <a:t>7/9</a:t>
+              <a:t>7/8</a:t>
             </a:r>
             <a:endParaRPr lang="de-IT" sz="1200" b="1" dirty="0">
               <a:solidFill>
@@ -6737,12 +6692,12 @@
           </a:lstStyle>
           <a:p>
             <a:r>
-              <a:rPr lang="de-DE" sz="1200" b="1" dirty="0">
+              <a:rPr lang="de-DE" sz="1200" b="1">
                 <a:solidFill>
                   <a:schemeClr val="bg1"/>
                 </a:solidFill>
               </a:rPr>
-              <a:t>8/9</a:t>
+              <a:t>8/8</a:t>
             </a:r>
             <a:endParaRPr lang="de-IT" sz="1200" b="1" dirty="0">
               <a:solidFill>
@@ -6794,369 +6749,6 @@
     <p:extLst>
       <p:ext uri="{BB962C8B-B14F-4D97-AF65-F5344CB8AC3E}">
         <p14:creationId xmlns:p14="http://schemas.microsoft.com/office/powerpoint/2010/main" val="62265825"/>
-      </p:ext>
-    </p:extLst>
-  </p:cSld>
-  <p:clrMapOvr>
-    <a:overrideClrMapping bg1="dk1" tx1="lt1" bg2="dk2" tx2="lt2" accent1="accent1" accent2="accent2" accent3="accent3" accent4="accent4" accent5="accent5" accent6="accent6" hlink="hlink" folHlink="folHlink"/>
-  </p:clrMapOvr>
-</p:sld>
-</file>
-
-<file path=ppt/slides/slide9.xml><?xml version="1.0" encoding="utf-8"?>
-<p:sld xmlns:a="http://schemas.openxmlformats.org/drawingml/2006/main" xmlns:r="http://schemas.openxmlformats.org/officeDocument/2006/relationships" xmlns:p="http://schemas.openxmlformats.org/presentationml/2006/main">
-  <p:cSld>
-    <p:bg>
-      <p:bgPr>
-        <a:solidFill>
-          <a:schemeClr val="bg1">
-            <a:tint val="95000"/>
-            <a:satMod val="170000"/>
-          </a:schemeClr>
-        </a:solidFill>
-        <a:effectLst/>
-      </p:bgPr>
-    </p:bg>
-    <p:spTree>
-      <p:nvGrpSpPr>
-        <p:cNvPr id="1" name="">
-          <a:extLst>
-            <a:ext uri="{FF2B5EF4-FFF2-40B4-BE49-F238E27FC236}">
-              <a16:creationId xmlns:a16="http://schemas.microsoft.com/office/drawing/2014/main" id="{3AD4CFED-D493-7C93-56E8-1527C1B39148}"/>
-            </a:ext>
-          </a:extLst>
-        </p:cNvPr>
-        <p:cNvGrpSpPr/>
-        <p:nvPr/>
-      </p:nvGrpSpPr>
-      <p:grpSpPr>
-        <a:xfrm>
-          <a:off x="0" y="0"/>
-          <a:ext cx="0" cy="0"/>
-          <a:chOff x="0" y="0"/>
-          <a:chExt cx="0" cy="0"/>
-        </a:xfrm>
-      </p:grpSpPr>
-      <p:sp>
-        <p:nvSpPr>
-          <p:cNvPr id="2" name="Titel 1">
-            <a:extLst>
-              <a:ext uri="{FF2B5EF4-FFF2-40B4-BE49-F238E27FC236}">
-                <a16:creationId xmlns:a16="http://schemas.microsoft.com/office/drawing/2014/main" id="{CD9B0250-0A8B-4FA0-2269-D92EA2F5167E}"/>
-              </a:ext>
-            </a:extLst>
-          </p:cNvPr>
-          <p:cNvSpPr>
-            <a:spLocks noGrp="1"/>
-          </p:cNvSpPr>
-          <p:nvPr>
-            <p:ph type="title"/>
-          </p:nvPr>
-        </p:nvSpPr>
-        <p:spPr>
-          <a:xfrm>
-            <a:off x="536713" y="130600"/>
-            <a:ext cx="9692640" cy="1325562"/>
-          </a:xfrm>
-        </p:spPr>
-        <p:txBody>
-          <a:bodyPr>
-            <a:normAutofit/>
-          </a:bodyPr>
-          <a:lstStyle/>
-          <a:p>
-            <a:r>
-              <a:rPr lang="de-DE" dirty="0"/>
-              <a:t>Future Work</a:t>
-            </a:r>
-            <a:endParaRPr lang="de-IT" dirty="0"/>
-          </a:p>
-        </p:txBody>
-      </p:sp>
-      <p:sp>
-        <p:nvSpPr>
-          <p:cNvPr id="4" name="Fußzeilenplatzhalter 3">
-            <a:extLst>
-              <a:ext uri="{FF2B5EF4-FFF2-40B4-BE49-F238E27FC236}">
-                <a16:creationId xmlns:a16="http://schemas.microsoft.com/office/drawing/2014/main" id="{1D982E0B-7C5B-0542-74AC-43AB338EC673}"/>
-              </a:ext>
-            </a:extLst>
-          </p:cNvPr>
-          <p:cNvSpPr>
-            <a:spLocks noGrp="1"/>
-          </p:cNvSpPr>
-          <p:nvPr>
-            <p:ph type="ftr" sz="quarter" idx="11"/>
-          </p:nvPr>
-        </p:nvSpPr>
-        <p:spPr/>
-        <p:txBody>
-          <a:bodyPr>
-            <a:normAutofit/>
-          </a:bodyPr>
-          <a:lstStyle/>
-          <a:p>
-            <a:endParaRPr lang="de-IT">
-              <a:solidFill>
-                <a:schemeClr val="tx1">
-                  <a:alpha val="70000"/>
-                </a:schemeClr>
-              </a:solidFill>
-            </a:endParaRPr>
-          </a:p>
-        </p:txBody>
-      </p:sp>
-      <p:sp>
-        <p:nvSpPr>
-          <p:cNvPr id="3" name="Textfeld 2">
-            <a:extLst>
-              <a:ext uri="{FF2B5EF4-FFF2-40B4-BE49-F238E27FC236}">
-                <a16:creationId xmlns:a16="http://schemas.microsoft.com/office/drawing/2014/main" id="{6F7A32EA-6F53-E22D-A8E1-663FAF5D0E8E}"/>
-              </a:ext>
-            </a:extLst>
-          </p:cNvPr>
-          <p:cNvSpPr txBox="1"/>
-          <p:nvPr/>
-        </p:nvSpPr>
-        <p:spPr>
-          <a:xfrm>
-            <a:off x="536713" y="1953039"/>
-            <a:ext cx="10157791" cy="2308324"/>
-          </a:xfrm>
-          <a:prstGeom prst="rect">
-            <a:avLst/>
-          </a:prstGeom>
-          <a:noFill/>
-        </p:spPr>
-        <p:txBody>
-          <a:bodyPr wrap="square" rtlCol="0">
-            <a:spAutoFit/>
-          </a:bodyPr>
-          <a:lstStyle/>
-          <a:p>
-            <a:pPr marL="285750" indent="-285750">
-              <a:buFont typeface="Arial" panose="020B0604020202020204" pitchFamily="34" charset="0"/>
-              <a:buChar char="•"/>
-            </a:pPr>
-            <a:r>
-              <a:rPr lang="de-DE" dirty="0"/>
-              <a:t>Verbesserung der Tool-Genauigkeit</a:t>
-            </a:r>
-          </a:p>
-          <a:p>
-            <a:pPr marL="742950" lvl="1" indent="-285750">
-              <a:buFont typeface="Arial" panose="020B0604020202020204" pitchFamily="34" charset="0"/>
-              <a:buChar char="•"/>
-            </a:pPr>
-            <a:r>
-              <a:rPr lang="de-DE" dirty="0"/>
-              <a:t>Verbesserung ChatGPT Prompts</a:t>
-            </a:r>
-          </a:p>
-          <a:p>
-            <a:pPr marL="742950" lvl="1" indent="-285750">
-              <a:buFont typeface="Arial" panose="020B0604020202020204" pitchFamily="34" charset="0"/>
-              <a:buChar char="•"/>
-            </a:pPr>
-            <a:r>
-              <a:rPr lang="de-DE" dirty="0" err="1"/>
-              <a:t>Named</a:t>
-            </a:r>
-            <a:r>
-              <a:rPr lang="de-DE" dirty="0"/>
-              <a:t> Entity Recognition (NER) um MSA-Bezug festzustellen</a:t>
-            </a:r>
-          </a:p>
-          <a:p>
-            <a:pPr marL="742950" lvl="1" indent="-285750">
-              <a:buFont typeface="Arial" panose="020B0604020202020204" pitchFamily="34" charset="0"/>
-              <a:buChar char="•"/>
-            </a:pPr>
-            <a:r>
-              <a:rPr lang="de-DE" dirty="0"/>
-              <a:t>Verfeinerung der Kombination von Tools</a:t>
-            </a:r>
-          </a:p>
-          <a:p>
-            <a:pPr marL="742950" lvl="1" indent="-285750">
-              <a:buFont typeface="Arial" panose="020B0604020202020204" pitchFamily="34" charset="0"/>
-              <a:buChar char="•"/>
-            </a:pPr>
-            <a:endParaRPr lang="de-DE" dirty="0"/>
-          </a:p>
-          <a:p>
-            <a:pPr marL="285750" indent="-285750">
-              <a:buFont typeface="Arial" panose="020B0604020202020204" pitchFamily="34" charset="0"/>
-              <a:buChar char="•"/>
-            </a:pPr>
-            <a:r>
-              <a:rPr lang="de-DE" dirty="0"/>
-              <a:t>Manuell größeren Datensatz klassifizieren</a:t>
-            </a:r>
-          </a:p>
-          <a:p>
-            <a:pPr marL="285750" indent="-285750">
-              <a:buFont typeface="Arial" panose="020B0604020202020204" pitchFamily="34" charset="0"/>
-              <a:buChar char="•"/>
-            </a:pPr>
-            <a:endParaRPr lang="de-DE" dirty="0"/>
-          </a:p>
-          <a:p>
-            <a:pPr marL="285750" indent="-285750">
-              <a:buFont typeface="Arial" panose="020B0604020202020204" pitchFamily="34" charset="0"/>
-              <a:buChar char="•"/>
-            </a:pPr>
-            <a:r>
-              <a:rPr lang="de-DE" dirty="0"/>
-              <a:t>Auswertung von Sentiment Trends über den gesamten Datensatz</a:t>
-            </a:r>
-          </a:p>
-        </p:txBody>
-      </p:sp>
-      <p:sp>
-        <p:nvSpPr>
-          <p:cNvPr id="5" name="Fußzeilenplatzhalter 3">
-            <a:extLst>
-              <a:ext uri="{FF2B5EF4-FFF2-40B4-BE49-F238E27FC236}">
-                <a16:creationId xmlns:a16="http://schemas.microsoft.com/office/drawing/2014/main" id="{0218D813-E0CA-22F3-A4F3-8FF0F18B30FF}"/>
-              </a:ext>
-            </a:extLst>
-          </p:cNvPr>
-          <p:cNvSpPr txBox="1">
-            <a:spLocks/>
-          </p:cNvSpPr>
-          <p:nvPr/>
-        </p:nvSpPr>
-        <p:spPr>
-          <a:xfrm>
-            <a:off x="11638722" y="6475343"/>
-            <a:ext cx="636105" cy="382657"/>
-          </a:xfrm>
-          <a:prstGeom prst="rect">
-            <a:avLst/>
-          </a:prstGeom>
-        </p:spPr>
-        <p:txBody>
-          <a:bodyPr vert="horz" lIns="91440" tIns="45720" rIns="91440" bIns="45720" rtlCol="0" anchor="ctr"/>
-          <a:lstStyle>
-            <a:defPPr>
-              <a:defRPr lang="en-US"/>
-            </a:defPPr>
-            <a:lvl1pPr marL="0" algn="l" defTabSz="457200" rtl="0" eaLnBrk="1" latinLnBrk="0" hangingPunct="1">
-              <a:defRPr sz="1050" kern="1200">
-                <a:solidFill>
-                  <a:schemeClr val="tx2">
-                    <a:lumMod val="20000"/>
-                    <a:lumOff val="80000"/>
-                  </a:schemeClr>
-                </a:solidFill>
-                <a:latin typeface="+mn-lt"/>
-                <a:ea typeface="+mn-ea"/>
-                <a:cs typeface="+mn-cs"/>
-              </a:defRPr>
-            </a:lvl1pPr>
-            <a:lvl2pPr marL="457200" algn="l" defTabSz="457200" rtl="0" eaLnBrk="1" latinLnBrk="0" hangingPunct="1">
-              <a:defRPr sz="1800" kern="1200">
-                <a:solidFill>
-                  <a:schemeClr val="tx1"/>
-                </a:solidFill>
-                <a:latin typeface="+mn-lt"/>
-                <a:ea typeface="+mn-ea"/>
-                <a:cs typeface="+mn-cs"/>
-              </a:defRPr>
-            </a:lvl2pPr>
-            <a:lvl3pPr marL="914400" algn="l" defTabSz="457200" rtl="0" eaLnBrk="1" latinLnBrk="0" hangingPunct="1">
-              <a:defRPr sz="1800" kern="1200">
-                <a:solidFill>
-                  <a:schemeClr val="tx1"/>
-                </a:solidFill>
-                <a:latin typeface="+mn-lt"/>
-                <a:ea typeface="+mn-ea"/>
-                <a:cs typeface="+mn-cs"/>
-              </a:defRPr>
-            </a:lvl3pPr>
-            <a:lvl4pPr marL="1371600" algn="l" defTabSz="457200" rtl="0" eaLnBrk="1" latinLnBrk="0" hangingPunct="1">
-              <a:defRPr sz="1800" kern="1200">
-                <a:solidFill>
-                  <a:schemeClr val="tx1"/>
-                </a:solidFill>
-                <a:latin typeface="+mn-lt"/>
-                <a:ea typeface="+mn-ea"/>
-                <a:cs typeface="+mn-cs"/>
-              </a:defRPr>
-            </a:lvl4pPr>
-            <a:lvl5pPr marL="1828800" algn="l" defTabSz="457200" rtl="0" eaLnBrk="1" latinLnBrk="0" hangingPunct="1">
-              <a:defRPr sz="1800" kern="1200">
-                <a:solidFill>
-                  <a:schemeClr val="tx1"/>
-                </a:solidFill>
-                <a:latin typeface="+mn-lt"/>
-                <a:ea typeface="+mn-ea"/>
-                <a:cs typeface="+mn-cs"/>
-              </a:defRPr>
-            </a:lvl5pPr>
-            <a:lvl6pPr marL="2286000" algn="l" defTabSz="457200" rtl="0" eaLnBrk="1" latinLnBrk="0" hangingPunct="1">
-              <a:defRPr sz="1800" kern="1200">
-                <a:solidFill>
-                  <a:schemeClr val="tx1"/>
-                </a:solidFill>
-                <a:latin typeface="+mn-lt"/>
-                <a:ea typeface="+mn-ea"/>
-                <a:cs typeface="+mn-cs"/>
-              </a:defRPr>
-            </a:lvl6pPr>
-            <a:lvl7pPr marL="2743200" algn="l" defTabSz="457200" rtl="0" eaLnBrk="1" latinLnBrk="0" hangingPunct="1">
-              <a:defRPr sz="1800" kern="1200">
-                <a:solidFill>
-                  <a:schemeClr val="tx1"/>
-                </a:solidFill>
-                <a:latin typeface="+mn-lt"/>
-                <a:ea typeface="+mn-ea"/>
-                <a:cs typeface="+mn-cs"/>
-              </a:defRPr>
-            </a:lvl7pPr>
-            <a:lvl8pPr marL="3200400" algn="l" defTabSz="457200" rtl="0" eaLnBrk="1" latinLnBrk="0" hangingPunct="1">
-              <a:defRPr sz="1800" kern="1200">
-                <a:solidFill>
-                  <a:schemeClr val="tx1"/>
-                </a:solidFill>
-                <a:latin typeface="+mn-lt"/>
-                <a:ea typeface="+mn-ea"/>
-                <a:cs typeface="+mn-cs"/>
-              </a:defRPr>
-            </a:lvl8pPr>
-            <a:lvl9pPr marL="3657600" algn="l" defTabSz="457200" rtl="0" eaLnBrk="1" latinLnBrk="0" hangingPunct="1">
-              <a:defRPr sz="1800" kern="1200">
-                <a:solidFill>
-                  <a:schemeClr val="tx1"/>
-                </a:solidFill>
-                <a:latin typeface="+mn-lt"/>
-                <a:ea typeface="+mn-ea"/>
-                <a:cs typeface="+mn-cs"/>
-              </a:defRPr>
-            </a:lvl9pPr>
-          </a:lstStyle>
-          <a:p>
-            <a:r>
-              <a:rPr lang="de-DE" sz="1200" b="1" dirty="0">
-                <a:solidFill>
-                  <a:schemeClr val="bg1"/>
-                </a:solidFill>
-              </a:rPr>
-              <a:t>9/9</a:t>
-            </a:r>
-            <a:endParaRPr lang="de-IT" sz="1200" b="1" dirty="0">
-              <a:solidFill>
-                <a:schemeClr val="bg1"/>
-              </a:solidFill>
-            </a:endParaRPr>
-          </a:p>
-        </p:txBody>
-      </p:sp>
-    </p:spTree>
-    <p:extLst>
-      <p:ext uri="{BB962C8B-B14F-4D97-AF65-F5344CB8AC3E}">
-        <p14:creationId xmlns:p14="http://schemas.microsoft.com/office/powerpoint/2010/main" val="1658123514"/>
       </p:ext>
     </p:extLst>
   </p:cSld>

</xml_diff>